<commit_message>
added dashboard links in presentation
</commit_message>
<xml_diff>
--- a/AccSevPred_Presentation.pptx
+++ b/AccSevPred_Presentation.pptx
@@ -10063,7 +10063,7 @@
               <a:rPr lang="en-US" dirty="0"/>
             </a:br>
             <a:r>
-              <a:rPr lang="en-US" sz="3100" u="sng" dirty="0">
+              <a:rPr lang="en-US" sz="2700" u="sng" dirty="0">
                 <a:hlinkClick r:id="rId2"/>
               </a:rPr>
               <a:t>https://us-acc-severity-prediction.herokuapp.com/</a:t>
@@ -10071,7 +10071,44 @@
             <a:br>
               <a:rPr lang="en-US" sz="3100" dirty="0"/>
             </a:br>
-            <a:endParaRPr lang="en-US" sz="3100" dirty="0"/>
+            <a:br>
+              <a:rPr lang="en-US" sz="3100" dirty="0"/>
+            </a:br>
+            <a:br>
+              <a:rPr lang="en-US" sz="3100" dirty="0"/>
+            </a:br>
+            <a:r>
+              <a:rPr lang="en-US" b="1" dirty="0"/>
+              <a:t>Dashboard</a:t>
+            </a:r>
+            <a:br>
+              <a:rPr lang="en-US" sz="3100" dirty="0"/>
+            </a:br>
+            <a:r>
+              <a:rPr lang="en-US" sz="2700" dirty="0">
+                <a:hlinkClick r:id="rId3"/>
+              </a:rPr>
+              <a:t>https://public.tableau.com/profile/rutabah8195#!/vizhome/USAccidents_15793603352260/Dashboard2</a:t>
+            </a:r>
+            <a:br>
+              <a:rPr lang="en-US" sz="2700" dirty="0"/>
+            </a:br>
+            <a:br>
+              <a:rPr lang="en-US" sz="2700" dirty="0"/>
+            </a:br>
+            <a:r>
+              <a:rPr lang="en-US" sz="2700" dirty="0">
+                <a:hlinkClick r:id="rId4">
+                  <a:extLst>
+                    <a:ext uri="{A12FA001-AC4F-418D-AE19-62706E023703}">
+                      <ahyp:hlinkClr xmlns:ahyp="http://schemas.microsoft.com/office/drawing/2018/hyperlinkcolor" val="tx"/>
+                    </a:ext>
+                  </a:extLst>
+                </a:hlinkClick>
+              </a:rPr>
+              <a:t>https://public.tableau.com/profile/rutabah8195#!/vizhome/USAccidentsMap/Dashboard1?publish=yes</a:t>
+            </a:r>
+            <a:endParaRPr lang="en-US" sz="2700" dirty="0"/>
           </a:p>
         </p:txBody>
       </p:sp>

</xml_diff>